<commit_message>
save progress on baby stuff
</commit_message>
<xml_diff>
--- a/baby-experiment/images/stimuli/wall_1.pptx
+++ b/baby-experiment/images/stimuli/wall_1.pptx
@@ -104,6 +104,11 @@
       </a:defRPr>
     </a:lvl9pPr>
   </p:defaultTextStyle>
+  <p:extLst>
+    <p:ext uri="{EFAFB233-063F-42B5-8137-9DF3F51BA10A}">
+      <p15:sldGuideLst xmlns:p15="http://schemas.microsoft.com/office/powerpoint/2012/main"/>
+    </p:ext>
+  </p:extLst>
 </p:presentation>
 </file>
 
@@ -238,7 +243,7 @@
           <a:p>
             <a:fld id="{C9062CCD-1B3A-F14B-BC66-FD02F7FD76DB}" type="datetimeFigureOut">
               <a:rPr lang="en-US" smtClean="0"/>
-              <a:t>2/8/21</a:t>
+              <a:t>2/10/21</a:t>
             </a:fld>
             <a:endParaRPr lang="en-US"/>
           </a:p>
@@ -408,7 +413,7 @@
           <a:p>
             <a:fld id="{C9062CCD-1B3A-F14B-BC66-FD02F7FD76DB}" type="datetimeFigureOut">
               <a:rPr lang="en-US" smtClean="0"/>
-              <a:t>2/8/21</a:t>
+              <a:t>2/10/21</a:t>
             </a:fld>
             <a:endParaRPr lang="en-US"/>
           </a:p>
@@ -588,7 +593,7 @@
           <a:p>
             <a:fld id="{C9062CCD-1B3A-F14B-BC66-FD02F7FD76DB}" type="datetimeFigureOut">
               <a:rPr lang="en-US" smtClean="0"/>
-              <a:t>2/8/21</a:t>
+              <a:t>2/10/21</a:t>
             </a:fld>
             <a:endParaRPr lang="en-US"/>
           </a:p>
@@ -758,7 +763,7 @@
           <a:p>
             <a:fld id="{C9062CCD-1B3A-F14B-BC66-FD02F7FD76DB}" type="datetimeFigureOut">
               <a:rPr lang="en-US" smtClean="0"/>
-              <a:t>2/8/21</a:t>
+              <a:t>2/10/21</a:t>
             </a:fld>
             <a:endParaRPr lang="en-US"/>
           </a:p>
@@ -1004,7 +1009,7 @@
           <a:p>
             <a:fld id="{C9062CCD-1B3A-F14B-BC66-FD02F7FD76DB}" type="datetimeFigureOut">
               <a:rPr lang="en-US" smtClean="0"/>
-              <a:t>2/8/21</a:t>
+              <a:t>2/10/21</a:t>
             </a:fld>
             <a:endParaRPr lang="en-US"/>
           </a:p>
@@ -1236,7 +1241,7 @@
           <a:p>
             <a:fld id="{C9062CCD-1B3A-F14B-BC66-FD02F7FD76DB}" type="datetimeFigureOut">
               <a:rPr lang="en-US" smtClean="0"/>
-              <a:t>2/8/21</a:t>
+              <a:t>2/10/21</a:t>
             </a:fld>
             <a:endParaRPr lang="en-US"/>
           </a:p>
@@ -1603,7 +1608,7 @@
           <a:p>
             <a:fld id="{C9062CCD-1B3A-F14B-BC66-FD02F7FD76DB}" type="datetimeFigureOut">
               <a:rPr lang="en-US" smtClean="0"/>
-              <a:t>2/8/21</a:t>
+              <a:t>2/10/21</a:t>
             </a:fld>
             <a:endParaRPr lang="en-US"/>
           </a:p>
@@ -1721,7 +1726,7 @@
           <a:p>
             <a:fld id="{C9062CCD-1B3A-F14B-BC66-FD02F7FD76DB}" type="datetimeFigureOut">
               <a:rPr lang="en-US" smtClean="0"/>
-              <a:t>2/8/21</a:t>
+              <a:t>2/10/21</a:t>
             </a:fld>
             <a:endParaRPr lang="en-US"/>
           </a:p>
@@ -1816,7 +1821,7 @@
           <a:p>
             <a:fld id="{C9062CCD-1B3A-F14B-BC66-FD02F7FD76DB}" type="datetimeFigureOut">
               <a:rPr lang="en-US" smtClean="0"/>
-              <a:t>2/8/21</a:t>
+              <a:t>2/10/21</a:t>
             </a:fld>
             <a:endParaRPr lang="en-US"/>
           </a:p>
@@ -2093,7 +2098,7 @@
           <a:p>
             <a:fld id="{C9062CCD-1B3A-F14B-BC66-FD02F7FD76DB}" type="datetimeFigureOut">
               <a:rPr lang="en-US" smtClean="0"/>
-              <a:t>2/8/21</a:t>
+              <a:t>2/10/21</a:t>
             </a:fld>
             <a:endParaRPr lang="en-US"/>
           </a:p>
@@ -2350,7 +2355,7 @@
           <a:p>
             <a:fld id="{C9062CCD-1B3A-F14B-BC66-FD02F7FD76DB}" type="datetimeFigureOut">
               <a:rPr lang="en-US" smtClean="0"/>
-              <a:t>2/8/21</a:t>
+              <a:t>2/10/21</a:t>
             </a:fld>
             <a:endParaRPr lang="en-US"/>
           </a:p>
@@ -2563,7 +2568,7 @@
           <a:p>
             <a:fld id="{C9062CCD-1B3A-F14B-BC66-FD02F7FD76DB}" type="datetimeFigureOut">
               <a:rPr lang="en-US" smtClean="0"/>
-              <a:t>2/8/21</a:t>
+              <a:t>2/10/21</a:t>
             </a:fld>
             <a:endParaRPr lang="en-US"/>
           </a:p>
@@ -2983,7 +2988,7 @@
           <p:nvPr/>
         </p:nvPicPr>
         <p:blipFill rotWithShape="1">
-          <a:blip r:embed="rId2"/>
+          <a:blip r:embed="rId3"/>
           <a:srcRect l="4697" t="20140" r="4719" b="19957"/>
           <a:stretch/>
         </p:blipFill>
@@ -3012,7 +3017,7 @@
           <p:nvPr/>
         </p:nvPicPr>
         <p:blipFill rotWithShape="1">
-          <a:blip r:embed="rId2">
+          <a:blip r:embed="rId3">
             <a:duotone>
               <a:schemeClr val="accent4">
                 <a:shade val="45000"/>
@@ -3092,6 +3097,29 @@
                                       </p:to>
                                     </p:set>
                                   </p:childTnLst>
+                                  <p:subTnLst>
+                                    <p:audio>
+                                      <p:cMediaNode>
+                                        <p:cTn display="0" masterRel="sameClick">
+                                          <p:stCondLst>
+                                            <p:cond evt="begin" delay="0">
+                                              <p:tn val="5"/>
+                                            </p:cond>
+                                          </p:stCondLst>
+                                          <p:endCondLst>
+                                            <p:cond evt="onStopAudio" delay="0">
+                                              <p:tgtEl>
+                                                <p:sldTgt/>
+                                              </p:tgtEl>
+                                            </p:cond>
+                                          </p:endCondLst>
+                                        </p:cTn>
+                                        <p:tgtEl>
+                                          <p:sndTgt r:embed="rId2" name="pop.wav"/>
+                                        </p:tgtEl>
+                                      </p:cMediaNode>
+                                    </p:audio>
+                                  </p:subTnLst>
                                 </p:cTn>
                               </p:par>
                             </p:childTnLst>

</xml_diff>

<commit_message>
added music and wrote some helper functions
</commit_message>
<xml_diff>
--- a/baby-experiment/images/stimuli/wall_1.pptx
+++ b/baby-experiment/images/stimuli/wall_1.pptx
@@ -243,7 +243,7 @@
           <a:p>
             <a:fld id="{C9062CCD-1B3A-F14B-BC66-FD02F7FD76DB}" type="datetimeFigureOut">
               <a:rPr lang="en-US" smtClean="0"/>
-              <a:t>2/13/21</a:t>
+              <a:t>2/17/21</a:t>
             </a:fld>
             <a:endParaRPr lang="en-US"/>
           </a:p>
@@ -413,7 +413,7 @@
           <a:p>
             <a:fld id="{C9062CCD-1B3A-F14B-BC66-FD02F7FD76DB}" type="datetimeFigureOut">
               <a:rPr lang="en-US" smtClean="0"/>
-              <a:t>2/13/21</a:t>
+              <a:t>2/17/21</a:t>
             </a:fld>
             <a:endParaRPr lang="en-US"/>
           </a:p>
@@ -593,7 +593,7 @@
           <a:p>
             <a:fld id="{C9062CCD-1B3A-F14B-BC66-FD02F7FD76DB}" type="datetimeFigureOut">
               <a:rPr lang="en-US" smtClean="0"/>
-              <a:t>2/13/21</a:t>
+              <a:t>2/17/21</a:t>
             </a:fld>
             <a:endParaRPr lang="en-US"/>
           </a:p>
@@ -763,7 +763,7 @@
           <a:p>
             <a:fld id="{C9062CCD-1B3A-F14B-BC66-FD02F7FD76DB}" type="datetimeFigureOut">
               <a:rPr lang="en-US" smtClean="0"/>
-              <a:t>2/13/21</a:t>
+              <a:t>2/17/21</a:t>
             </a:fld>
             <a:endParaRPr lang="en-US"/>
           </a:p>
@@ -1009,7 +1009,7 @@
           <a:p>
             <a:fld id="{C9062CCD-1B3A-F14B-BC66-FD02F7FD76DB}" type="datetimeFigureOut">
               <a:rPr lang="en-US" smtClean="0"/>
-              <a:t>2/13/21</a:t>
+              <a:t>2/17/21</a:t>
             </a:fld>
             <a:endParaRPr lang="en-US"/>
           </a:p>
@@ -1241,7 +1241,7 @@
           <a:p>
             <a:fld id="{C9062CCD-1B3A-F14B-BC66-FD02F7FD76DB}" type="datetimeFigureOut">
               <a:rPr lang="en-US" smtClean="0"/>
-              <a:t>2/13/21</a:t>
+              <a:t>2/17/21</a:t>
             </a:fld>
             <a:endParaRPr lang="en-US"/>
           </a:p>
@@ -1608,7 +1608,7 @@
           <a:p>
             <a:fld id="{C9062CCD-1B3A-F14B-BC66-FD02F7FD76DB}" type="datetimeFigureOut">
               <a:rPr lang="en-US" smtClean="0"/>
-              <a:t>2/13/21</a:t>
+              <a:t>2/17/21</a:t>
             </a:fld>
             <a:endParaRPr lang="en-US"/>
           </a:p>
@@ -1726,7 +1726,7 @@
           <a:p>
             <a:fld id="{C9062CCD-1B3A-F14B-BC66-FD02F7FD76DB}" type="datetimeFigureOut">
               <a:rPr lang="en-US" smtClean="0"/>
-              <a:t>2/13/21</a:t>
+              <a:t>2/17/21</a:t>
             </a:fld>
             <a:endParaRPr lang="en-US"/>
           </a:p>
@@ -1821,7 +1821,7 @@
           <a:p>
             <a:fld id="{C9062CCD-1B3A-F14B-BC66-FD02F7FD76DB}" type="datetimeFigureOut">
               <a:rPr lang="en-US" smtClean="0"/>
-              <a:t>2/13/21</a:t>
+              <a:t>2/17/21</a:t>
             </a:fld>
             <a:endParaRPr lang="en-US"/>
           </a:p>
@@ -2098,7 +2098,7 @@
           <a:p>
             <a:fld id="{C9062CCD-1B3A-F14B-BC66-FD02F7FD76DB}" type="datetimeFigureOut">
               <a:rPr lang="en-US" smtClean="0"/>
-              <a:t>2/13/21</a:t>
+              <a:t>2/17/21</a:t>
             </a:fld>
             <a:endParaRPr lang="en-US"/>
           </a:p>
@@ -2355,7 +2355,7 @@
           <a:p>
             <a:fld id="{C9062CCD-1B3A-F14B-BC66-FD02F7FD76DB}" type="datetimeFigureOut">
               <a:rPr lang="en-US" smtClean="0"/>
-              <a:t>2/13/21</a:t>
+              <a:t>2/17/21</a:t>
             </a:fld>
             <a:endParaRPr lang="en-US"/>
           </a:p>
@@ -2568,7 +2568,7 @@
           <a:p>
             <a:fld id="{C9062CCD-1B3A-F14B-BC66-FD02F7FD76DB}" type="datetimeFigureOut">
               <a:rPr lang="en-US" smtClean="0"/>
-              <a:t>2/13/21</a:t>
+              <a:t>2/17/21</a:t>
             </a:fld>
             <a:endParaRPr lang="en-US"/>
           </a:p>

</xml_diff>